<commit_message>
Added new statistics app population
</commit_message>
<xml_diff>
--- a/dfesite/media/industry/sample/Stat_industry.pptx
+++ b/dfesite/media/industry/sample/Stat_industry.pptx
@@ -197,7 +197,7 @@
           <a:p>
             <a:fld id="{EBF8E82D-ACAD-4E7D-A576-0D023E3067B3}" type="datetimeFigureOut">
               <a:rPr lang="ru-RU" smtClean="0"/>
-              <a:t>08.12.2020</a:t>
+              <a:t>23.12.2021</a:t>
             </a:fld>
             <a:endParaRPr lang="ru-RU"/>
           </a:p>
@@ -533,7 +533,7 @@
           <a:p>
             <a:fld id="{124B6C02-144F-4328-A45E-07C003A36F6F}" type="datetime1">
               <a:rPr lang="ru-RU" smtClean="0"/>
-              <a:t>08.12.2020</a:t>
+              <a:t>23.12.2021</a:t>
             </a:fld>
             <a:endParaRPr lang="ru-RU"/>
           </a:p>
@@ -754,7 +754,7 @@
           <a:p>
             <a:fld id="{1A9D12E5-A472-47E9-BCC1-94460AA1F774}" type="datetime1">
               <a:rPr lang="ru-RU" smtClean="0"/>
-              <a:t>08.12.2020</a:t>
+              <a:t>23.12.2021</a:t>
             </a:fld>
             <a:endParaRPr lang="ru-RU"/>
           </a:p>
@@ -968,7 +968,7 @@
           <a:p>
             <a:fld id="{2CBE4975-3AE8-46C1-8AD1-32D29F40DF61}" type="datetime1">
               <a:rPr lang="ru-RU" smtClean="0"/>
-              <a:t>08.12.2020</a:t>
+              <a:t>23.12.2021</a:t>
             </a:fld>
             <a:endParaRPr lang="ru-RU"/>
           </a:p>
@@ -1373,47 +1373,6 @@
           </a:extLst>
         </p:spPr>
       </p:pic>
-      <p:pic>
-        <p:nvPicPr>
-          <p:cNvPr id="16" name="Picture 23" descr="D:\Foto\01. ЛОГО\НАО_PNG_01.png"/>
-          <p:cNvPicPr>
-            <a:picLocks noChangeAspect="1" noChangeArrowheads="1"/>
-          </p:cNvPicPr>
-          <p:nvPr/>
-        </p:nvPicPr>
-        <p:blipFill>
-          <a:blip r:embed="rId4" cstate="print">
-            <a:extLst>
-              <a:ext uri="{28A0092B-C50C-407E-A947-70E740481C1C}">
-                <a14:useLocalDpi xmlns:a14="http://schemas.microsoft.com/office/drawing/2010/main" val="0"/>
-              </a:ext>
-            </a:extLst>
-          </a:blip>
-          <a:srcRect/>
-          <a:stretch>
-            <a:fillRect/>
-          </a:stretch>
-        </p:blipFill>
-        <p:spPr bwMode="auto">
-          <a:xfrm>
-            <a:off x="1003740" y="119721"/>
-            <a:ext cx="1391820" cy="638126"/>
-          </a:xfrm>
-          <a:prstGeom prst="rect">
-            <a:avLst/>
-          </a:prstGeom>
-          <a:noFill/>
-          <a:extLst>
-            <a:ext uri="{909E8E84-426E-40DD-AFC4-6F175D3DCCD1}">
-              <a14:hiddenFill xmlns:a14="http://schemas.microsoft.com/office/drawing/2010/main">
-                <a:solidFill>
-                  <a:srgbClr val="FFFFFF"/>
-                </a:solidFill>
-              </a14:hiddenFill>
-            </a:ext>
-          </a:extLst>
-        </p:spPr>
-      </p:pic>
       <p:sp>
         <p:nvSpPr>
           <p:cNvPr id="36" name="Скругленный прямоугольник 35"/>
@@ -1522,15 +1481,138 @@
           <a:lstStyle/>
           <a:p>
             <a:r>
-              <a:rPr sz="2600" b="1">
+              <a:rPr sz="2600" b="1" dirty="0">
                 <a:solidFill>
                   <a:srgbClr val="376092"/>
                 </a:solidFill>
                 <a:latin typeface="Calibri"/>
               </a:rPr>
-              <a:t>О промышленном производстве в январе-феврале 2020 года
-в Ненецком автономном округе</a:t>
-            </a:r>
+              <a:t>О </a:t>
+            </a:r>
+            <a:r>
+              <a:rPr sz="2600" b="1" dirty="0" err="1">
+                <a:solidFill>
+                  <a:srgbClr val="376092"/>
+                </a:solidFill>
+                <a:latin typeface="Calibri"/>
+              </a:rPr>
+              <a:t>промышленном</a:t>
+            </a:r>
+            <a:r>
+              <a:rPr sz="2600" b="1" dirty="0">
+                <a:solidFill>
+                  <a:srgbClr val="376092"/>
+                </a:solidFill>
+                <a:latin typeface="Calibri"/>
+              </a:rPr>
+              <a:t> </a:t>
+            </a:r>
+            <a:r>
+              <a:rPr sz="2600" b="1" dirty="0" err="1">
+                <a:solidFill>
+                  <a:srgbClr val="376092"/>
+                </a:solidFill>
+                <a:latin typeface="Calibri"/>
+              </a:rPr>
+              <a:t>производстве</a:t>
+            </a:r>
+            <a:r>
+              <a:rPr sz="2600" b="1" dirty="0">
+                <a:solidFill>
+                  <a:srgbClr val="376092"/>
+                </a:solidFill>
+                <a:latin typeface="Calibri"/>
+              </a:rPr>
+              <a:t> в </a:t>
+            </a:r>
+            <a:r>
+              <a:rPr sz="2600" b="1" dirty="0" err="1">
+                <a:solidFill>
+                  <a:srgbClr val="376092"/>
+                </a:solidFill>
+                <a:latin typeface="Calibri"/>
+              </a:rPr>
+              <a:t>январе-феврале</a:t>
+            </a:r>
+            <a:r>
+              <a:rPr sz="2600" b="1" dirty="0">
+                <a:solidFill>
+                  <a:srgbClr val="376092"/>
+                </a:solidFill>
+                <a:latin typeface="Calibri"/>
+              </a:rPr>
+              <a:t> 2020 </a:t>
+            </a:r>
+            <a:r>
+              <a:rPr sz="2600" b="1" dirty="0" err="1">
+                <a:solidFill>
+                  <a:srgbClr val="376092"/>
+                </a:solidFill>
+                <a:latin typeface="Calibri"/>
+              </a:rPr>
+              <a:t>года</a:t>
+            </a:r>
+            <a:r>
+              <a:rPr sz="2600" b="1" dirty="0">
+                <a:solidFill>
+                  <a:srgbClr val="376092"/>
+                </a:solidFill>
+                <a:latin typeface="Calibri"/>
+              </a:rPr>
+              <a:t>
+в </a:t>
+            </a:r>
+            <a:r>
+              <a:rPr sz="2600" b="1" dirty="0" err="1">
+                <a:solidFill>
+                  <a:srgbClr val="376092"/>
+                </a:solidFill>
+                <a:latin typeface="Calibri"/>
+              </a:rPr>
+              <a:t>Ненецком</a:t>
+            </a:r>
+            <a:r>
+              <a:rPr sz="2600" b="1" dirty="0">
+                <a:solidFill>
+                  <a:srgbClr val="376092"/>
+                </a:solidFill>
+                <a:latin typeface="Calibri"/>
+              </a:rPr>
+              <a:t> </a:t>
+            </a:r>
+            <a:r>
+              <a:rPr sz="2600" b="1" dirty="0" err="1">
+                <a:solidFill>
+                  <a:srgbClr val="376092"/>
+                </a:solidFill>
+                <a:latin typeface="Calibri"/>
+              </a:rPr>
+              <a:t>автономном</a:t>
+            </a:r>
+            <a:r>
+              <a:rPr sz="2600" b="1" dirty="0">
+                <a:solidFill>
+                  <a:srgbClr val="376092"/>
+                </a:solidFill>
+                <a:latin typeface="Calibri"/>
+              </a:rPr>
+              <a:t> </a:t>
+            </a:r>
+            <a:r>
+              <a:rPr sz="2600" b="1" dirty="0" err="1">
+                <a:solidFill>
+                  <a:srgbClr val="376092"/>
+                </a:solidFill>
+                <a:latin typeface="Calibri"/>
+              </a:rPr>
+              <a:t>округе</a:t>
+            </a:r>
+            <a:endParaRPr sz="2600" b="1" dirty="0">
+              <a:solidFill>
+                <a:srgbClr val="376092"/>
+              </a:solidFill>
+              <a:latin typeface="Calibri"/>
+            </a:endParaRPr>
           </a:p>
         </p:txBody>
       </p:sp>
@@ -3029,6 +3111,54 @@
       <p:pic>
         <p:nvPicPr>
           <p:cNvPr id="92" name="Picture 11" descr="D:\02. Поручения руководства\12. Разное\160919 Статистика дл ВК инфограф\jixodjG9T.png"/>
+          <p:cNvPicPr>
+            <a:picLocks noChangeAspect="1" noChangeArrowheads="1"/>
+          </p:cNvPicPr>
+          <p:nvPr/>
+        </p:nvPicPr>
+        <p:blipFill>
+          <a:blip r:embed="rId4" cstate="print">
+            <a:duotone>
+              <a:schemeClr val="accent1">
+                <a:shade val="45000"/>
+                <a:satMod val="135000"/>
+              </a:schemeClr>
+              <a:prstClr val="white"/>
+            </a:duotone>
+            <a:extLst>
+              <a:ext uri="{28A0092B-C50C-407E-A947-70E740481C1C}">
+                <a14:useLocalDpi xmlns:a14="http://schemas.microsoft.com/office/drawing/2010/main" val="0"/>
+              </a:ext>
+            </a:extLst>
+          </a:blip>
+          <a:srcRect/>
+          <a:stretch>
+            <a:fillRect/>
+          </a:stretch>
+        </p:blipFill>
+        <p:spPr bwMode="auto">
+          <a:xfrm>
+            <a:off x="2824401" y="3856243"/>
+            <a:ext cx="421010" cy="410567"/>
+          </a:xfrm>
+          <a:prstGeom prst="rect">
+            <a:avLst/>
+          </a:prstGeom>
+          <a:noFill/>
+          <a:extLst>
+            <a:ext uri="{909E8E84-426E-40DD-AFC4-6F175D3DCCD1}">
+              <a14:hiddenFill xmlns:a14="http://schemas.microsoft.com/office/drawing/2010/main">
+                <a:solidFill>
+                  <a:srgbClr val="FFFFFF"/>
+                </a:solidFill>
+              </a14:hiddenFill>
+            </a:ext>
+          </a:extLst>
+        </p:spPr>
+      </p:pic>
+      <p:pic>
+        <p:nvPicPr>
+          <p:cNvPr id="93" name="Picture 12" descr="http://download.seaicons.com/icons/icons8/windows-8/512/Industry-Oil-Industry-icon.png"/>
           <p:cNvPicPr>
             <a:picLocks noChangeAspect="1" noChangeArrowheads="1"/>
           </p:cNvPicPr>
@@ -3056,8 +3186,8 @@
         </p:blipFill>
         <p:spPr bwMode="auto">
           <a:xfrm>
-            <a:off x="2824401" y="3856243"/>
-            <a:ext cx="421010" cy="410567"/>
+            <a:off x="2836906" y="4734110"/>
+            <a:ext cx="396000" cy="396000"/>
           </a:xfrm>
           <a:prstGeom prst="rect">
             <a:avLst/>
@@ -3076,7 +3206,7 @@
       </p:pic>
       <p:pic>
         <p:nvPicPr>
-          <p:cNvPr id="93" name="Picture 12" descr="http://download.seaicons.com/icons/icons8/windows-8/512/Industry-Oil-Industry-icon.png"/>
+          <p:cNvPr id="94" name="Picture 18" descr="http://freevector.co/wp-content/uploads/2011/10/12155-breakfast-bread-toasts1.png"/>
           <p:cNvPicPr>
             <a:picLocks noChangeAspect="1" noChangeArrowheads="1"/>
           </p:cNvPicPr>
@@ -3104,8 +3234,8 @@
         </p:blipFill>
         <p:spPr bwMode="auto">
           <a:xfrm>
-            <a:off x="2836906" y="4734110"/>
-            <a:ext cx="396000" cy="396000"/>
+            <a:off x="2824401" y="5594111"/>
+            <a:ext cx="468987" cy="467814"/>
           </a:xfrm>
           <a:prstGeom prst="rect">
             <a:avLst/>
@@ -3124,7 +3254,7 @@
       </p:pic>
       <p:pic>
         <p:nvPicPr>
-          <p:cNvPr id="94" name="Picture 18" descr="http://freevector.co/wp-content/uploads/2011/10/12155-breakfast-bread-toasts1.png"/>
+          <p:cNvPr id="95" name="Picture 4" descr="http://micropower-global.com/wp-content/uploads/2016/01/power-industry-icon.png"/>
           <p:cNvPicPr>
             <a:picLocks noChangeAspect="1" noChangeArrowheads="1"/>
           </p:cNvPicPr>
@@ -3152,8 +3282,8 @@
         </p:blipFill>
         <p:spPr bwMode="auto">
           <a:xfrm>
-            <a:off x="2824401" y="5594111"/>
-            <a:ext cx="468987" cy="467814"/>
+            <a:off x="2744711" y="2877643"/>
+            <a:ext cx="628366" cy="628366"/>
           </a:xfrm>
           <a:prstGeom prst="rect">
             <a:avLst/>
@@ -3172,7 +3302,7 @@
       </p:pic>
       <p:pic>
         <p:nvPicPr>
-          <p:cNvPr id="95" name="Picture 4" descr="http://micropower-global.com/wp-content/uploads/2016/01/power-industry-icon.png"/>
+          <p:cNvPr id="96" name="Picture 6" descr="https://www.shareicon.net/download/2015/12/29/694888_cake_512x512.png"/>
           <p:cNvPicPr>
             <a:picLocks noChangeAspect="1" noChangeArrowheads="1"/>
           </p:cNvPicPr>
@@ -3200,8 +3330,8 @@
         </p:blipFill>
         <p:spPr bwMode="auto">
           <a:xfrm>
-            <a:off x="2744711" y="2877643"/>
-            <a:ext cx="628366" cy="628366"/>
+            <a:off x="7646057" y="2940790"/>
+            <a:ext cx="502072" cy="502072"/>
           </a:xfrm>
           <a:prstGeom prst="rect">
             <a:avLst/>
@@ -3220,7 +3350,7 @@
       </p:pic>
       <p:pic>
         <p:nvPicPr>
-          <p:cNvPr id="96" name="Picture 6" descr="https://www.shareicon.net/download/2015/12/29/694888_cake_512x512.png"/>
+          <p:cNvPr id="97" name="Picture 12" descr="https://d30y9cdsu7xlg0.cloudfront.net/png/71959-200.png"/>
           <p:cNvPicPr>
             <a:picLocks noChangeAspect="1" noChangeArrowheads="1"/>
           </p:cNvPicPr>
@@ -3248,8 +3378,8 @@
         </p:blipFill>
         <p:spPr bwMode="auto">
           <a:xfrm>
-            <a:off x="7646057" y="2940790"/>
-            <a:ext cx="502072" cy="502072"/>
+            <a:off x="7632571" y="3885335"/>
+            <a:ext cx="483174" cy="418406"/>
           </a:xfrm>
           <a:prstGeom prst="rect">
             <a:avLst/>
@@ -3268,7 +3398,7 @@
       </p:pic>
       <p:pic>
         <p:nvPicPr>
-          <p:cNvPr id="97" name="Picture 12" descr="https://d30y9cdsu7xlg0.cloudfront.net/png/71959-200.png"/>
+          <p:cNvPr id="99" name="Picture 8" descr="http://www.buldumbuldum.com/urun_tasarlayici/images/designs/9df3396d-61de-4d96-a9bb-754a8abf1730.png"/>
           <p:cNvPicPr>
             <a:picLocks noChangeAspect="1" noChangeArrowheads="1"/>
           </p:cNvPicPr>
@@ -3296,54 +3426,6 @@
         </p:blipFill>
         <p:spPr bwMode="auto">
           <a:xfrm>
-            <a:off x="7632571" y="3885335"/>
-            <a:ext cx="483174" cy="418406"/>
-          </a:xfrm>
-          <a:prstGeom prst="rect">
-            <a:avLst/>
-          </a:prstGeom>
-          <a:noFill/>
-          <a:extLst>
-            <a:ext uri="{909E8E84-426E-40DD-AFC4-6F175D3DCCD1}">
-              <a14:hiddenFill xmlns:a14="http://schemas.microsoft.com/office/drawing/2010/main">
-                <a:solidFill>
-                  <a:srgbClr val="FFFFFF"/>
-                </a:solidFill>
-              </a14:hiddenFill>
-            </a:ext>
-          </a:extLst>
-        </p:spPr>
-      </p:pic>
-      <p:pic>
-        <p:nvPicPr>
-          <p:cNvPr id="99" name="Picture 8" descr="http://www.buldumbuldum.com/urun_tasarlayici/images/designs/9df3396d-61de-4d96-a9bb-754a8abf1730.png"/>
-          <p:cNvPicPr>
-            <a:picLocks noChangeAspect="1" noChangeArrowheads="1"/>
-          </p:cNvPicPr>
-          <p:nvPr/>
-        </p:nvPicPr>
-        <p:blipFill>
-          <a:blip r:embed="rId11" cstate="print">
-            <a:duotone>
-              <a:schemeClr val="accent1">
-                <a:shade val="45000"/>
-                <a:satMod val="135000"/>
-              </a:schemeClr>
-              <a:prstClr val="white"/>
-            </a:duotone>
-            <a:extLst>
-              <a:ext uri="{28A0092B-C50C-407E-A947-70E740481C1C}">
-                <a14:useLocalDpi xmlns:a14="http://schemas.microsoft.com/office/drawing/2010/main" val="0"/>
-              </a:ext>
-            </a:extLst>
-          </a:blip>
-          <a:srcRect/>
-          <a:stretch>
-            <a:fillRect/>
-          </a:stretch>
-        </p:blipFill>
-        <p:spPr bwMode="auto">
-          <a:xfrm>
             <a:off x="7632571" y="5631751"/>
             <a:ext cx="495468" cy="462419"/>
           </a:xfrm>
@@ -3460,7 +3542,7 @@
           <p:nvPr/>
         </p:nvPicPr>
         <p:blipFill rotWithShape="1">
-          <a:blip r:embed="rId12">
+          <a:blip r:embed="rId11">
             <a:duotone>
               <a:schemeClr val="accent1">
                 <a:shade val="45000"/>
@@ -3531,6 +3613,36 @@
           </a:p>
         </p:txBody>
       </p:sp>
+      <p:pic>
+        <p:nvPicPr>
+          <p:cNvPr id="64" name="Рисунок 63"/>
+          <p:cNvPicPr>
+            <a:picLocks noChangeAspect="1"/>
+          </p:cNvPicPr>
+          <p:nvPr/>
+        </p:nvPicPr>
+        <p:blipFill>
+          <a:blip r:embed="rId12" cstate="print">
+            <a:extLst>
+              <a:ext uri="{28A0092B-C50C-407E-A947-70E740481C1C}">
+                <a14:useLocalDpi xmlns:a14="http://schemas.microsoft.com/office/drawing/2010/main" val="0"/>
+              </a:ext>
+            </a:extLst>
+          </a:blip>
+          <a:stretch>
+            <a:fillRect/>
+          </a:stretch>
+        </p:blipFill>
+        <p:spPr>
+          <a:xfrm>
+            <a:off x="635410" y="0"/>
+            <a:ext cx="1394008" cy="717821"/>
+          </a:xfrm>
+          <a:prstGeom prst="rect">
+            <a:avLst/>
+          </a:prstGeom>
+        </p:spPr>
+      </p:pic>
     </p:spTree>
     <p:extLst>
       <p:ext uri="{BB962C8B-B14F-4D97-AF65-F5344CB8AC3E}">

</xml_diff>

<commit_message>
Add new and modified files
</commit_message>
<xml_diff>
--- a/dfesite/media/industry/sample/Stat_industry.pptx
+++ b/dfesite/media/industry/sample/Stat_industry.pptx
@@ -197,7 +197,7 @@
           <a:p>
             <a:fld id="{EBF8E82D-ACAD-4E7D-A576-0D023E3067B3}" type="datetimeFigureOut">
               <a:rPr lang="ru-RU" smtClean="0"/>
-              <a:t>08.12.2020</a:t>
+              <a:t>23.12.2021</a:t>
             </a:fld>
             <a:endParaRPr lang="ru-RU"/>
           </a:p>
@@ -533,7 +533,7 @@
           <a:p>
             <a:fld id="{124B6C02-144F-4328-A45E-07C003A36F6F}" type="datetime1">
               <a:rPr lang="ru-RU" smtClean="0"/>
-              <a:t>08.12.2020</a:t>
+              <a:t>23.12.2021</a:t>
             </a:fld>
             <a:endParaRPr lang="ru-RU"/>
           </a:p>
@@ -754,7 +754,7 @@
           <a:p>
             <a:fld id="{1A9D12E5-A472-47E9-BCC1-94460AA1F774}" type="datetime1">
               <a:rPr lang="ru-RU" smtClean="0"/>
-              <a:t>08.12.2020</a:t>
+              <a:t>23.12.2021</a:t>
             </a:fld>
             <a:endParaRPr lang="ru-RU"/>
           </a:p>
@@ -968,7 +968,7 @@
           <a:p>
             <a:fld id="{2CBE4975-3AE8-46C1-8AD1-32D29F40DF61}" type="datetime1">
               <a:rPr lang="ru-RU" smtClean="0"/>
-              <a:t>08.12.2020</a:t>
+              <a:t>23.12.2021</a:t>
             </a:fld>
             <a:endParaRPr lang="ru-RU"/>
           </a:p>
@@ -1373,47 +1373,6 @@
           </a:extLst>
         </p:spPr>
       </p:pic>
-      <p:pic>
-        <p:nvPicPr>
-          <p:cNvPr id="16" name="Picture 23" descr="D:\Foto\01. ЛОГО\НАО_PNG_01.png"/>
-          <p:cNvPicPr>
-            <a:picLocks noChangeAspect="1" noChangeArrowheads="1"/>
-          </p:cNvPicPr>
-          <p:nvPr/>
-        </p:nvPicPr>
-        <p:blipFill>
-          <a:blip r:embed="rId4" cstate="print">
-            <a:extLst>
-              <a:ext uri="{28A0092B-C50C-407E-A947-70E740481C1C}">
-                <a14:useLocalDpi xmlns:a14="http://schemas.microsoft.com/office/drawing/2010/main" val="0"/>
-              </a:ext>
-            </a:extLst>
-          </a:blip>
-          <a:srcRect/>
-          <a:stretch>
-            <a:fillRect/>
-          </a:stretch>
-        </p:blipFill>
-        <p:spPr bwMode="auto">
-          <a:xfrm>
-            <a:off x="1003740" y="119721"/>
-            <a:ext cx="1391820" cy="638126"/>
-          </a:xfrm>
-          <a:prstGeom prst="rect">
-            <a:avLst/>
-          </a:prstGeom>
-          <a:noFill/>
-          <a:extLst>
-            <a:ext uri="{909E8E84-426E-40DD-AFC4-6F175D3DCCD1}">
-              <a14:hiddenFill xmlns:a14="http://schemas.microsoft.com/office/drawing/2010/main">
-                <a:solidFill>
-                  <a:srgbClr val="FFFFFF"/>
-                </a:solidFill>
-              </a14:hiddenFill>
-            </a:ext>
-          </a:extLst>
-        </p:spPr>
-      </p:pic>
       <p:sp>
         <p:nvSpPr>
           <p:cNvPr id="36" name="Скругленный прямоугольник 35"/>
@@ -1522,15 +1481,138 @@
           <a:lstStyle/>
           <a:p>
             <a:r>
-              <a:rPr sz="2600" b="1">
+              <a:rPr sz="2600" b="1" dirty="0">
                 <a:solidFill>
                   <a:srgbClr val="376092"/>
                 </a:solidFill>
                 <a:latin typeface="Calibri"/>
               </a:rPr>
-              <a:t>О промышленном производстве в январе-феврале 2020 года
-в Ненецком автономном округе</a:t>
-            </a:r>
+              <a:t>О </a:t>
+            </a:r>
+            <a:r>
+              <a:rPr sz="2600" b="1" dirty="0" err="1">
+                <a:solidFill>
+                  <a:srgbClr val="376092"/>
+                </a:solidFill>
+                <a:latin typeface="Calibri"/>
+              </a:rPr>
+              <a:t>промышленном</a:t>
+            </a:r>
+            <a:r>
+              <a:rPr sz="2600" b="1" dirty="0">
+                <a:solidFill>
+                  <a:srgbClr val="376092"/>
+                </a:solidFill>
+                <a:latin typeface="Calibri"/>
+              </a:rPr>
+              <a:t> </a:t>
+            </a:r>
+            <a:r>
+              <a:rPr sz="2600" b="1" dirty="0" err="1">
+                <a:solidFill>
+                  <a:srgbClr val="376092"/>
+                </a:solidFill>
+                <a:latin typeface="Calibri"/>
+              </a:rPr>
+              <a:t>производстве</a:t>
+            </a:r>
+            <a:r>
+              <a:rPr sz="2600" b="1" dirty="0">
+                <a:solidFill>
+                  <a:srgbClr val="376092"/>
+                </a:solidFill>
+                <a:latin typeface="Calibri"/>
+              </a:rPr>
+              <a:t> в </a:t>
+            </a:r>
+            <a:r>
+              <a:rPr sz="2600" b="1" dirty="0" err="1">
+                <a:solidFill>
+                  <a:srgbClr val="376092"/>
+                </a:solidFill>
+                <a:latin typeface="Calibri"/>
+              </a:rPr>
+              <a:t>январе-феврале</a:t>
+            </a:r>
+            <a:r>
+              <a:rPr sz="2600" b="1" dirty="0">
+                <a:solidFill>
+                  <a:srgbClr val="376092"/>
+                </a:solidFill>
+                <a:latin typeface="Calibri"/>
+              </a:rPr>
+              <a:t> 2020 </a:t>
+            </a:r>
+            <a:r>
+              <a:rPr sz="2600" b="1" dirty="0" err="1">
+                <a:solidFill>
+                  <a:srgbClr val="376092"/>
+                </a:solidFill>
+                <a:latin typeface="Calibri"/>
+              </a:rPr>
+              <a:t>года</a:t>
+            </a:r>
+            <a:r>
+              <a:rPr sz="2600" b="1" dirty="0">
+                <a:solidFill>
+                  <a:srgbClr val="376092"/>
+                </a:solidFill>
+                <a:latin typeface="Calibri"/>
+              </a:rPr>
+              <a:t>
+в </a:t>
+            </a:r>
+            <a:r>
+              <a:rPr sz="2600" b="1" dirty="0" err="1">
+                <a:solidFill>
+                  <a:srgbClr val="376092"/>
+                </a:solidFill>
+                <a:latin typeface="Calibri"/>
+              </a:rPr>
+              <a:t>Ненецком</a:t>
+            </a:r>
+            <a:r>
+              <a:rPr sz="2600" b="1" dirty="0">
+                <a:solidFill>
+                  <a:srgbClr val="376092"/>
+                </a:solidFill>
+                <a:latin typeface="Calibri"/>
+              </a:rPr>
+              <a:t> </a:t>
+            </a:r>
+            <a:r>
+              <a:rPr sz="2600" b="1" dirty="0" err="1">
+                <a:solidFill>
+                  <a:srgbClr val="376092"/>
+                </a:solidFill>
+                <a:latin typeface="Calibri"/>
+              </a:rPr>
+              <a:t>автономном</a:t>
+            </a:r>
+            <a:r>
+              <a:rPr sz="2600" b="1" dirty="0">
+                <a:solidFill>
+                  <a:srgbClr val="376092"/>
+                </a:solidFill>
+                <a:latin typeface="Calibri"/>
+              </a:rPr>
+              <a:t> </a:t>
+            </a:r>
+            <a:r>
+              <a:rPr sz="2600" b="1" dirty="0" err="1">
+                <a:solidFill>
+                  <a:srgbClr val="376092"/>
+                </a:solidFill>
+                <a:latin typeface="Calibri"/>
+              </a:rPr>
+              <a:t>округе</a:t>
+            </a:r>
+            <a:endParaRPr sz="2600" b="1" dirty="0">
+              <a:solidFill>
+                <a:srgbClr val="376092"/>
+              </a:solidFill>
+              <a:latin typeface="Calibri"/>
+            </a:endParaRPr>
           </a:p>
         </p:txBody>
       </p:sp>
@@ -3029,6 +3111,54 @@
       <p:pic>
         <p:nvPicPr>
           <p:cNvPr id="92" name="Picture 11" descr="D:\02. Поручения руководства\12. Разное\160919 Статистика дл ВК инфограф\jixodjG9T.png"/>
+          <p:cNvPicPr>
+            <a:picLocks noChangeAspect="1" noChangeArrowheads="1"/>
+          </p:cNvPicPr>
+          <p:nvPr/>
+        </p:nvPicPr>
+        <p:blipFill>
+          <a:blip r:embed="rId4" cstate="print">
+            <a:duotone>
+              <a:schemeClr val="accent1">
+                <a:shade val="45000"/>
+                <a:satMod val="135000"/>
+              </a:schemeClr>
+              <a:prstClr val="white"/>
+            </a:duotone>
+            <a:extLst>
+              <a:ext uri="{28A0092B-C50C-407E-A947-70E740481C1C}">
+                <a14:useLocalDpi xmlns:a14="http://schemas.microsoft.com/office/drawing/2010/main" val="0"/>
+              </a:ext>
+            </a:extLst>
+          </a:blip>
+          <a:srcRect/>
+          <a:stretch>
+            <a:fillRect/>
+          </a:stretch>
+        </p:blipFill>
+        <p:spPr bwMode="auto">
+          <a:xfrm>
+            <a:off x="2824401" y="3856243"/>
+            <a:ext cx="421010" cy="410567"/>
+          </a:xfrm>
+          <a:prstGeom prst="rect">
+            <a:avLst/>
+          </a:prstGeom>
+          <a:noFill/>
+          <a:extLst>
+            <a:ext uri="{909E8E84-426E-40DD-AFC4-6F175D3DCCD1}">
+              <a14:hiddenFill xmlns:a14="http://schemas.microsoft.com/office/drawing/2010/main">
+                <a:solidFill>
+                  <a:srgbClr val="FFFFFF"/>
+                </a:solidFill>
+              </a14:hiddenFill>
+            </a:ext>
+          </a:extLst>
+        </p:spPr>
+      </p:pic>
+      <p:pic>
+        <p:nvPicPr>
+          <p:cNvPr id="93" name="Picture 12" descr="http://download.seaicons.com/icons/icons8/windows-8/512/Industry-Oil-Industry-icon.png"/>
           <p:cNvPicPr>
             <a:picLocks noChangeAspect="1" noChangeArrowheads="1"/>
           </p:cNvPicPr>
@@ -3056,8 +3186,8 @@
         </p:blipFill>
         <p:spPr bwMode="auto">
           <a:xfrm>
-            <a:off x="2824401" y="3856243"/>
-            <a:ext cx="421010" cy="410567"/>
+            <a:off x="2836906" y="4734110"/>
+            <a:ext cx="396000" cy="396000"/>
           </a:xfrm>
           <a:prstGeom prst="rect">
             <a:avLst/>
@@ -3076,7 +3206,7 @@
       </p:pic>
       <p:pic>
         <p:nvPicPr>
-          <p:cNvPr id="93" name="Picture 12" descr="http://download.seaicons.com/icons/icons8/windows-8/512/Industry-Oil-Industry-icon.png"/>
+          <p:cNvPr id="94" name="Picture 18" descr="http://freevector.co/wp-content/uploads/2011/10/12155-breakfast-bread-toasts1.png"/>
           <p:cNvPicPr>
             <a:picLocks noChangeAspect="1" noChangeArrowheads="1"/>
           </p:cNvPicPr>
@@ -3104,8 +3234,8 @@
         </p:blipFill>
         <p:spPr bwMode="auto">
           <a:xfrm>
-            <a:off x="2836906" y="4734110"/>
-            <a:ext cx="396000" cy="396000"/>
+            <a:off x="2824401" y="5594111"/>
+            <a:ext cx="468987" cy="467814"/>
           </a:xfrm>
           <a:prstGeom prst="rect">
             <a:avLst/>
@@ -3124,7 +3254,7 @@
       </p:pic>
       <p:pic>
         <p:nvPicPr>
-          <p:cNvPr id="94" name="Picture 18" descr="http://freevector.co/wp-content/uploads/2011/10/12155-breakfast-bread-toasts1.png"/>
+          <p:cNvPr id="95" name="Picture 4" descr="http://micropower-global.com/wp-content/uploads/2016/01/power-industry-icon.png"/>
           <p:cNvPicPr>
             <a:picLocks noChangeAspect="1" noChangeArrowheads="1"/>
           </p:cNvPicPr>
@@ -3152,8 +3282,8 @@
         </p:blipFill>
         <p:spPr bwMode="auto">
           <a:xfrm>
-            <a:off x="2824401" y="5594111"/>
-            <a:ext cx="468987" cy="467814"/>
+            <a:off x="2744711" y="2877643"/>
+            <a:ext cx="628366" cy="628366"/>
           </a:xfrm>
           <a:prstGeom prst="rect">
             <a:avLst/>
@@ -3172,7 +3302,7 @@
       </p:pic>
       <p:pic>
         <p:nvPicPr>
-          <p:cNvPr id="95" name="Picture 4" descr="http://micropower-global.com/wp-content/uploads/2016/01/power-industry-icon.png"/>
+          <p:cNvPr id="96" name="Picture 6" descr="https://www.shareicon.net/download/2015/12/29/694888_cake_512x512.png"/>
           <p:cNvPicPr>
             <a:picLocks noChangeAspect="1" noChangeArrowheads="1"/>
           </p:cNvPicPr>
@@ -3200,8 +3330,8 @@
         </p:blipFill>
         <p:spPr bwMode="auto">
           <a:xfrm>
-            <a:off x="2744711" y="2877643"/>
-            <a:ext cx="628366" cy="628366"/>
+            <a:off x="7646057" y="2940790"/>
+            <a:ext cx="502072" cy="502072"/>
           </a:xfrm>
           <a:prstGeom prst="rect">
             <a:avLst/>
@@ -3220,7 +3350,7 @@
       </p:pic>
       <p:pic>
         <p:nvPicPr>
-          <p:cNvPr id="96" name="Picture 6" descr="https://www.shareicon.net/download/2015/12/29/694888_cake_512x512.png"/>
+          <p:cNvPr id="97" name="Picture 12" descr="https://d30y9cdsu7xlg0.cloudfront.net/png/71959-200.png"/>
           <p:cNvPicPr>
             <a:picLocks noChangeAspect="1" noChangeArrowheads="1"/>
           </p:cNvPicPr>
@@ -3248,8 +3378,8 @@
         </p:blipFill>
         <p:spPr bwMode="auto">
           <a:xfrm>
-            <a:off x="7646057" y="2940790"/>
-            <a:ext cx="502072" cy="502072"/>
+            <a:off x="7632571" y="3885335"/>
+            <a:ext cx="483174" cy="418406"/>
           </a:xfrm>
           <a:prstGeom prst="rect">
             <a:avLst/>
@@ -3268,7 +3398,7 @@
       </p:pic>
       <p:pic>
         <p:nvPicPr>
-          <p:cNvPr id="97" name="Picture 12" descr="https://d30y9cdsu7xlg0.cloudfront.net/png/71959-200.png"/>
+          <p:cNvPr id="99" name="Picture 8" descr="http://www.buldumbuldum.com/urun_tasarlayici/images/designs/9df3396d-61de-4d96-a9bb-754a8abf1730.png"/>
           <p:cNvPicPr>
             <a:picLocks noChangeAspect="1" noChangeArrowheads="1"/>
           </p:cNvPicPr>
@@ -3296,54 +3426,6 @@
         </p:blipFill>
         <p:spPr bwMode="auto">
           <a:xfrm>
-            <a:off x="7632571" y="3885335"/>
-            <a:ext cx="483174" cy="418406"/>
-          </a:xfrm>
-          <a:prstGeom prst="rect">
-            <a:avLst/>
-          </a:prstGeom>
-          <a:noFill/>
-          <a:extLst>
-            <a:ext uri="{909E8E84-426E-40DD-AFC4-6F175D3DCCD1}">
-              <a14:hiddenFill xmlns:a14="http://schemas.microsoft.com/office/drawing/2010/main">
-                <a:solidFill>
-                  <a:srgbClr val="FFFFFF"/>
-                </a:solidFill>
-              </a14:hiddenFill>
-            </a:ext>
-          </a:extLst>
-        </p:spPr>
-      </p:pic>
-      <p:pic>
-        <p:nvPicPr>
-          <p:cNvPr id="99" name="Picture 8" descr="http://www.buldumbuldum.com/urun_tasarlayici/images/designs/9df3396d-61de-4d96-a9bb-754a8abf1730.png"/>
-          <p:cNvPicPr>
-            <a:picLocks noChangeAspect="1" noChangeArrowheads="1"/>
-          </p:cNvPicPr>
-          <p:nvPr/>
-        </p:nvPicPr>
-        <p:blipFill>
-          <a:blip r:embed="rId11" cstate="print">
-            <a:duotone>
-              <a:schemeClr val="accent1">
-                <a:shade val="45000"/>
-                <a:satMod val="135000"/>
-              </a:schemeClr>
-              <a:prstClr val="white"/>
-            </a:duotone>
-            <a:extLst>
-              <a:ext uri="{28A0092B-C50C-407E-A947-70E740481C1C}">
-                <a14:useLocalDpi xmlns:a14="http://schemas.microsoft.com/office/drawing/2010/main" val="0"/>
-              </a:ext>
-            </a:extLst>
-          </a:blip>
-          <a:srcRect/>
-          <a:stretch>
-            <a:fillRect/>
-          </a:stretch>
-        </p:blipFill>
-        <p:spPr bwMode="auto">
-          <a:xfrm>
             <a:off x="7632571" y="5631751"/>
             <a:ext cx="495468" cy="462419"/>
           </a:xfrm>
@@ -3460,7 +3542,7 @@
           <p:nvPr/>
         </p:nvPicPr>
         <p:blipFill rotWithShape="1">
-          <a:blip r:embed="rId12">
+          <a:blip r:embed="rId11">
             <a:duotone>
               <a:schemeClr val="accent1">
                 <a:shade val="45000"/>
@@ -3531,6 +3613,36 @@
           </a:p>
         </p:txBody>
       </p:sp>
+      <p:pic>
+        <p:nvPicPr>
+          <p:cNvPr id="64" name="Рисунок 63"/>
+          <p:cNvPicPr>
+            <a:picLocks noChangeAspect="1"/>
+          </p:cNvPicPr>
+          <p:nvPr/>
+        </p:nvPicPr>
+        <p:blipFill>
+          <a:blip r:embed="rId12" cstate="print">
+            <a:extLst>
+              <a:ext uri="{28A0092B-C50C-407E-A947-70E740481C1C}">
+                <a14:useLocalDpi xmlns:a14="http://schemas.microsoft.com/office/drawing/2010/main" val="0"/>
+              </a:ext>
+            </a:extLst>
+          </a:blip>
+          <a:stretch>
+            <a:fillRect/>
+          </a:stretch>
+        </p:blipFill>
+        <p:spPr>
+          <a:xfrm>
+            <a:off x="635410" y="0"/>
+            <a:ext cx="1394008" cy="717821"/>
+          </a:xfrm>
+          <a:prstGeom prst="rect">
+            <a:avLst/>
+          </a:prstGeom>
+        </p:spPr>
+      </p:pic>
     </p:spTree>
     <p:extLst>
       <p:ext uri="{BB962C8B-B14F-4D97-AF65-F5344CB8AC3E}">

</xml_diff>